<commit_message>
Inleverversie van poster2 en de pdf bestanden er bij gezet
</commit_message>
<xml_diff>
--- a/Posters/PosterWeek2-r.pptx
+++ b/Posters/PosterWeek2-r.pptx
@@ -373,7 +373,7 @@
             <a:fld id="{E3903A65-E77A-4CCE-9E24-496910D426DC}" type="datetimeFigureOut">
               <a:rPr lang="nl-NL" smtClean="0"/>
               <a:pPr/>
-              <a:t>8-1-2015</a:t>
+              <a:t>9-1-2015</a:t>
             </a:fld>
             <a:endParaRPr lang="nl-NL"/>
           </a:p>
@@ -986,7 +986,7 @@
             <a:fld id="{E3903A65-E77A-4CCE-9E24-496910D426DC}" type="datetimeFigureOut">
               <a:rPr lang="nl-NL" smtClean="0"/>
               <a:pPr/>
-              <a:t>8-1-2015</a:t>
+              <a:t>9-1-2015</a:t>
             </a:fld>
             <a:endParaRPr lang="nl-NL"/>
           </a:p>
@@ -1170,7 +1170,7 @@
             <a:fld id="{E3903A65-E77A-4CCE-9E24-496910D426DC}" type="datetimeFigureOut">
               <a:rPr lang="nl-NL" smtClean="0"/>
               <a:pPr/>
-              <a:t>8-1-2015</a:t>
+              <a:t>9-1-2015</a:t>
             </a:fld>
             <a:endParaRPr lang="nl-NL"/>
           </a:p>
@@ -1400,7 +1400,7 @@
             <a:fld id="{E3903A65-E77A-4CCE-9E24-496910D426DC}" type="datetimeFigureOut">
               <a:rPr lang="nl-NL" smtClean="0"/>
               <a:pPr/>
-              <a:t>8-1-2015</a:t>
+              <a:t>9-1-2015</a:t>
             </a:fld>
             <a:endParaRPr lang="nl-NL"/>
           </a:p>
@@ -1656,7 +1656,7 @@
             <a:fld id="{E3903A65-E77A-4CCE-9E24-496910D426DC}" type="datetimeFigureOut">
               <a:rPr lang="nl-NL" smtClean="0"/>
               <a:pPr/>
-              <a:t>8-1-2015</a:t>
+              <a:t>9-1-2015</a:t>
             </a:fld>
             <a:endParaRPr lang="nl-NL"/>
           </a:p>
@@ -1782,7 +1782,7 @@
             <a:fld id="{E3903A65-E77A-4CCE-9E24-496910D426DC}" type="datetimeFigureOut">
               <a:rPr lang="nl-NL" smtClean="0"/>
               <a:pPr/>
-              <a:t>8-1-2015</a:t>
+              <a:t>9-1-2015</a:t>
             </a:fld>
             <a:endParaRPr lang="nl-NL"/>
           </a:p>
@@ -2156,7 +2156,7 @@
             <a:fld id="{E3903A65-E77A-4CCE-9E24-496910D426DC}" type="datetimeFigureOut">
               <a:rPr lang="nl-NL" smtClean="0"/>
               <a:pPr/>
-              <a:t>8-1-2015</a:t>
+              <a:t>9-1-2015</a:t>
             </a:fld>
             <a:endParaRPr lang="nl-NL"/>
           </a:p>
@@ -2396,7 +2396,7 @@
             <a:fld id="{E3903A65-E77A-4CCE-9E24-496910D426DC}" type="datetimeFigureOut">
               <a:rPr lang="nl-NL" smtClean="0"/>
               <a:pPr/>
-              <a:t>8-1-2015</a:t>
+              <a:t>9-1-2015</a:t>
             </a:fld>
             <a:endParaRPr lang="nl-NL"/>
           </a:p>
@@ -2495,7 +2495,7 @@
             <a:fld id="{E3903A65-E77A-4CCE-9E24-496910D426DC}" type="datetimeFigureOut">
               <a:rPr lang="nl-NL" smtClean="0"/>
               <a:pPr/>
-              <a:t>8-1-2015</a:t>
+              <a:t>9-1-2015</a:t>
             </a:fld>
             <a:endParaRPr lang="nl-NL"/>
           </a:p>
@@ -2763,7 +2763,7 @@
             <a:fld id="{E3903A65-E77A-4CCE-9E24-496910D426DC}" type="datetimeFigureOut">
               <a:rPr lang="nl-NL" smtClean="0"/>
               <a:pPr/>
-              <a:t>8-1-2015</a:t>
+              <a:t>9-1-2015</a:t>
             </a:fld>
             <a:endParaRPr lang="nl-NL"/>
           </a:p>
@@ -3036,7 +3036,7 @@
             <a:fld id="{E3903A65-E77A-4CCE-9E24-496910D426DC}" type="datetimeFigureOut">
               <a:rPr lang="nl-NL" smtClean="0"/>
               <a:pPr/>
-              <a:t>8-1-2015</a:t>
+              <a:t>9-1-2015</a:t>
             </a:fld>
             <a:endParaRPr lang="nl-NL"/>
           </a:p>
@@ -3580,7 +3580,7 @@
             <a:fld id="{E3903A65-E77A-4CCE-9E24-496910D426DC}" type="datetimeFigureOut">
               <a:rPr lang="nl-NL" smtClean="0"/>
               <a:pPr/>
-              <a:t>8-1-2015</a:t>
+              <a:t>9-1-2015</a:t>
             </a:fld>
             <a:endParaRPr lang="nl-NL"/>
           </a:p>
@@ -4435,8 +4435,8 @@
         </p:nvSpPr>
         <p:spPr>
           <a:xfrm>
-            <a:off x="874509" y="2938027"/>
-            <a:ext cx="5349165" cy="1598577"/>
+            <a:off x="874509" y="2938025"/>
+            <a:ext cx="5349165" cy="2099375"/>
           </a:xfrm>
           <a:ln/>
         </p:spPr>
@@ -4456,7 +4456,7 @@
         </p:style>
         <p:txBody>
           <a:bodyPr>
-            <a:normAutofit/>
+            <a:normAutofit lnSpcReduction="10000"/>
           </a:bodyPr>
           <a:lstStyle/>
           <a:p>
@@ -4464,36 +4464,100 @@
               <a:buNone/>
             </a:pPr>
             <a:r>
+              <a:rPr lang="en-US" sz="1100" dirty="0" smtClean="0"/>
+              <a:t>This iteration included a two week holiday, so we </a:t>
+            </a:r>
+            <a:r>
               <a:rPr lang="en-US" sz="1100" dirty="0"/>
-              <a:t>With the short break we managed to do some extra things. We changed the </a:t>
-            </a:r>
-            <a:r>
-              <a:rPr lang="en-US" sz="1100" dirty="0" smtClean="0"/>
-              <a:t>GUI </a:t>
-            </a:r>
-            <a:r>
-              <a:rPr lang="en-US" sz="1100" dirty="0" smtClean="0"/>
-              <a:t>and </a:t>
+              <a:t>managed to do some extra things. We changed the </a:t>
+            </a:r>
+            <a:r>
+              <a:rPr lang="en-US" sz="1100" dirty="0" smtClean="0"/>
+              <a:t>GUI and </a:t>
             </a:r>
             <a:r>
               <a:rPr lang="en-US" sz="1100" dirty="0"/>
-              <a:t>we began with the recognition system. For this we used OCR (Optical character recognition) and </a:t>
-            </a:r>
-            <a:r>
-              <a:rPr lang="en-US" sz="1100" dirty="0" smtClean="0"/>
-              <a:t>we began to segment the license plate from the picture to read every character.  As a result of that we are now able to detect the license plates and write down the licenses. There are only some problems with this, for example it write down a lot licenses and these we all different. An other problem was that in one case it is able to read something at all and then the system crashes. This error is made by our  implementation of our </a:t>
-            </a:r>
-            <a:r>
-              <a:rPr lang="en-US" sz="1100" dirty="0" smtClean="0"/>
-              <a:t>OCR-</a:t>
-            </a:r>
-            <a:r>
-              <a:rPr lang="en-US" sz="1100" dirty="0" smtClean="0"/>
-              <a:t>function</a:t>
-            </a:r>
-            <a:r>
-              <a:rPr lang="en-US" sz="1100" dirty="0" smtClean="0"/>
-              <a:t>.</a:t>
+              <a:t>we </a:t>
+            </a:r>
+            <a:r>
+              <a:rPr lang="en-US" sz="1100" dirty="0" smtClean="0"/>
+              <a:t>started experimenting with the text </a:t>
+            </a:r>
+            <a:r>
+              <a:rPr lang="en-US" sz="1100" dirty="0"/>
+              <a:t>recognition </a:t>
+            </a:r>
+            <a:r>
+              <a:rPr lang="en-US" sz="1100" dirty="0" smtClean="0"/>
+              <a:t>systems. </a:t>
+            </a:r>
+            <a:r>
+              <a:rPr lang="en-US" sz="1100" dirty="0"/>
+              <a:t>For this we used OCR (Optical </a:t>
+            </a:r>
+            <a:r>
+              <a:rPr lang="en-US" sz="1100" dirty="0"/>
+              <a:t>C</a:t>
+            </a:r>
+            <a:r>
+              <a:rPr lang="en-US" sz="1100" dirty="0" smtClean="0"/>
+              <a:t>haracter Recognition</a:t>
+            </a:r>
+            <a:r>
+              <a:rPr lang="en-US" sz="1100" dirty="0"/>
+              <a:t>) and </a:t>
+            </a:r>
+            <a:r>
+              <a:rPr lang="en-US" sz="1100" dirty="0" smtClean="0"/>
+              <a:t>we began to segment the license plate from the picture to read every character.  As a result of that we are now able to detect the license plates and </a:t>
+            </a:r>
+            <a:r>
+              <a:rPr lang="en-US" sz="1100" dirty="0" smtClean="0"/>
+              <a:t>show </a:t>
+            </a:r>
+            <a:r>
+              <a:rPr lang="en-US" sz="1100" dirty="0" smtClean="0"/>
+              <a:t>the them in the list. </a:t>
+            </a:r>
+            <a:r>
+              <a:rPr lang="en-US" sz="1100" dirty="0" smtClean="0"/>
+              <a:t>There are </a:t>
+            </a:r>
+            <a:r>
+              <a:rPr lang="en-US" sz="1100" dirty="0" smtClean="0"/>
+              <a:t>some </a:t>
+            </a:r>
+            <a:r>
+              <a:rPr lang="en-US" sz="1100" dirty="0" smtClean="0"/>
+              <a:t>problems with this, for example </a:t>
+            </a:r>
+            <a:r>
+              <a:rPr lang="en-US" sz="1100" dirty="0" smtClean="0"/>
+              <a:t>that we don’t really compare the license plates to check if they are correct so the list becomes flooded with incorrect license plates. Another </a:t>
+            </a:r>
+            <a:r>
+              <a:rPr lang="en-US" sz="1100" dirty="0" smtClean="0"/>
+              <a:t>problem </a:t>
+            </a:r>
+            <a:r>
+              <a:rPr lang="en-US" sz="1100" dirty="0" smtClean="0"/>
+              <a:t>is that it sometimes crashes because it can’t find the license plate, because they are some yellow objects in the background. </a:t>
+            </a:r>
+            <a:r>
+              <a:rPr lang="en-US" sz="1100" dirty="0" smtClean="0"/>
+              <a:t>This error is made by our  implementation of our </a:t>
+            </a:r>
+            <a:r>
+              <a:rPr lang="en-US" sz="1100" dirty="0" smtClean="0"/>
+              <a:t>OCR-function when it can’t find any characters. But what we worry about the most is that the processing is taking a lot of time. The average time to process a frame is almost 300 </a:t>
+            </a:r>
+            <a:r>
+              <a:rPr lang="en-US" sz="1100" dirty="0" err="1" smtClean="0"/>
+              <a:t>ms</a:t>
+            </a:r>
+            <a:r>
+              <a:rPr lang="en-US" sz="1100" dirty="0" smtClean="0"/>
+              <a:t>, which is almost 10 times slower than it should be. </a:t>
             </a:r>
             <a:endParaRPr lang="nl-NL" sz="1100" dirty="0"/>
           </a:p>
@@ -4512,7 +4576,7 @@
         <p:spPr>
           <a:xfrm>
             <a:off x="6438695" y="3859733"/>
-            <a:ext cx="5349165" cy="9677875"/>
+            <a:ext cx="5349165" cy="9782147"/>
           </a:xfrm>
           <a:ln/>
         </p:spPr>
@@ -4540,8 +4604,28 @@
               <a:buNone/>
             </a:pPr>
             <a:r>
+              <a:rPr lang="en-US" sz="1100" dirty="0" smtClean="0"/>
+              <a:t>In this iteration we focused on implementing OCR (Optical </a:t>
+            </a:r>
+            <a:r>
               <a:rPr lang="en-US" sz="1100" dirty="0"/>
-              <a:t>After the license plate segmentation was complete, we tried to use OCR (Optical Character Recognition) to recognize the characters on the license plate. At first, we used the built-in OCR function of </a:t>
+              <a:t>Character Recognition) </a:t>
+            </a:r>
+            <a:r>
+              <a:rPr lang="en-US" sz="1100" dirty="0" smtClean="0"/>
+              <a:t>into our program to </a:t>
+            </a:r>
+            <a:r>
+              <a:rPr lang="en-US" sz="1100" dirty="0"/>
+              <a:t>recognize the characters on the license </a:t>
+            </a:r>
+            <a:r>
+              <a:rPr lang="en-US" sz="1100" dirty="0" smtClean="0"/>
+              <a:t>plates. </a:t>
+            </a:r>
+            <a:r>
+              <a:rPr lang="en-US" sz="1100" dirty="0"/>
+              <a:t>At first, we used the built-in OCR function of </a:t>
             </a:r>
             <a:r>
               <a:rPr lang="en-US" sz="1100" dirty="0" err="1" smtClean="0"/>
@@ -4553,7 +4637,15 @@
             </a:r>
             <a:r>
               <a:rPr lang="en-US" sz="1100" dirty="0"/>
-              <a:t>we managed to get working, but it was very slow. Here are some results (if the result is the same as the previous one, it’s not added</a:t>
+              <a:t>we managed to get working, but it was very slow. Here are some results (if the result </a:t>
+            </a:r>
+            <a:r>
+              <a:rPr lang="en-US" sz="1100" dirty="0" smtClean="0"/>
+              <a:t>in the list is </a:t>
+            </a:r>
+            <a:r>
+              <a:rPr lang="en-US" sz="1100" dirty="0"/>
+              <a:t>the same as the previous one, it’s not added</a:t>
             </a:r>
             <a:r>
               <a:rPr lang="en-US" sz="1100" dirty="0" smtClean="0"/>
@@ -4656,7 +4748,15 @@
             </a:pPr>
             <a:r>
               <a:rPr lang="en-US" sz="1100" dirty="0"/>
-              <a:t>In many cases the result was incorrect, so we started thinking about other OCR methods. We now use a library of every possible character on Dutch license plates and find the highest correlation between every object found in the license plate and every character from our library. These are the characters we use</a:t>
+              <a:t>In many cases the result was incorrect, so we started thinking about other OCR methods. We now use </a:t>
+            </a:r>
+            <a:r>
+              <a:rPr lang="en-US" sz="1100" dirty="0" smtClean="0"/>
+              <a:t>our own OCR function with a </a:t>
+            </a:r>
+            <a:r>
+              <a:rPr lang="en-US" sz="1100" dirty="0"/>
+              <a:t>library of every possible character on Dutch license plates and find the highest correlation between every object found in the license plate and every character from our library. These are the characters we use</a:t>
             </a:r>
             <a:r>
               <a:rPr lang="en-US" sz="1100" dirty="0" smtClean="0"/>
@@ -4675,8 +4775,13 @@
             </a:pPr>
             <a:r>
               <a:rPr lang="en-US" sz="1100" dirty="0"/>
-              <a:t>After we managed to get it working, the results were surprisingly good but it wasn’t a whole lot faster:</a:t>
-            </a:r>
+              <a:t>After we managed to get it working, the results were surprisingly good but it </a:t>
+            </a:r>
+            <a:r>
+              <a:rPr lang="en-US" sz="1100" dirty="0" smtClean="0"/>
+              <a:t>was even slower than the previous method:</a:t>
+            </a:r>
+            <a:endParaRPr lang="en-US" sz="1100" dirty="0"/>
           </a:p>
           <a:p>
             <a:pPr marL="0" indent="0">
@@ -4770,8 +4875,30 @@
             </a:r>
             <a:r>
               <a:rPr lang="en-US" sz="1100" dirty="0" smtClean="0"/>
-              <a:t>is not good, which we will explain further in the next section.</a:t>
-            </a:r>
+              <a:t>is not </a:t>
+            </a:r>
+            <a:r>
+              <a:rPr lang="en-US" sz="1100" dirty="0" smtClean="0"/>
+              <a:t>perfect, </a:t>
+            </a:r>
+            <a:r>
+              <a:rPr lang="en-US" sz="1100" dirty="0" smtClean="0"/>
+              <a:t>which we will explain further in the next section</a:t>
+            </a:r>
+            <a:r>
+              <a:rPr lang="en-US" sz="1100" dirty="0" smtClean="0"/>
+              <a:t>.</a:t>
+            </a:r>
+          </a:p>
+          <a:p>
+            <a:pPr marL="0" indent="0">
+              <a:buNone/>
+            </a:pPr>
+            <a:r>
+              <a:rPr lang="en-US" sz="1100" dirty="0" smtClean="0"/>
+              <a:t>We had some problems with recognizing the dashes between characters, so we disabled that they can be recognized for the time being. </a:t>
+            </a:r>
+            <a:endParaRPr lang="en-US" sz="1100" dirty="0" smtClean="0"/>
           </a:p>
           <a:p>
             <a:pPr marL="0" indent="0">
@@ -4785,9 +4912,37 @@
             </a:pPr>
             <a:r>
               <a:rPr lang="en-US" sz="1100" dirty="0" smtClean="0"/>
-              <a:t>This process is quite costly, mostly because we have to resize every character to the size of every object for every frame to calculate the correlation.  This could be precomputed but we would have to have a library of every character in every size. </a:t>
-            </a:r>
-            <a:endParaRPr lang="en-US" sz="1100" dirty="0"/>
+              <a:t>This </a:t>
+            </a:r>
+            <a:r>
+              <a:rPr lang="en-US" sz="1100" dirty="0" smtClean="0"/>
+              <a:t>process </a:t>
+            </a:r>
+            <a:r>
+              <a:rPr lang="en-US" sz="1100" dirty="0" smtClean="0"/>
+              <a:t>is quite costly, mostly because we have to resize every character to the size of every object for every frame to calculate the correlation.  This could be precomputed but we would have to have a </a:t>
+            </a:r>
+            <a:r>
+              <a:rPr lang="en-US" sz="1100" dirty="0" smtClean="0"/>
+              <a:t>huge library </a:t>
+            </a:r>
+            <a:r>
+              <a:rPr lang="en-US" sz="1100" dirty="0" smtClean="0"/>
+              <a:t>of every character in every </a:t>
+            </a:r>
+            <a:r>
+              <a:rPr lang="en-US" sz="1100" dirty="0" smtClean="0"/>
+              <a:t>size</a:t>
+            </a:r>
+            <a:r>
+              <a:rPr lang="en-US" sz="1100" dirty="0" smtClean="0"/>
+              <a:t>. </a:t>
+            </a:r>
+            <a:r>
+              <a:rPr lang="en-US" sz="1100" dirty="0" smtClean="0"/>
+              <a:t>Another way to speed up the process would be to skip some frames if we are confident that the correct license plate has been found. </a:t>
+            </a:r>
+            <a:endParaRPr lang="en-US" sz="1100" dirty="0" smtClean="0"/>
           </a:p>
         </p:txBody>
       </p:sp>
@@ -4871,7 +5026,7 @@
         <p:spPr>
           <a:xfrm>
             <a:off x="12087182" y="2736404"/>
-            <a:ext cx="5349165" cy="7225486"/>
+            <a:ext cx="5349165" cy="6192688"/>
           </a:xfrm>
           <a:ln/>
         </p:spPr>
@@ -5081,7 +5236,7 @@
           <a:blip r:embed="rId2" cstate="print">
             <a:extLst>
               <a:ext uri="{28A0092B-C50C-407E-A947-70E740481C1C}">
-                <a14:useLocalDpi xmlns:a14="http://schemas.microsoft.com/office/drawing/2010/main" xmlns="" val="0"/>
+                <a14:useLocalDpi xmlns:a14="http://schemas.microsoft.com/office/drawing/2010/main" val="0"/>
               </a:ext>
             </a:extLst>
           </a:blip>
@@ -5101,7 +5256,7 @@
           <a:noFill/>
           <a:extLst>
             <a:ext uri="{909E8E84-426E-40DD-AFC4-6F175D3DCCD1}">
-              <a14:hiddenFill xmlns:a14="http://schemas.microsoft.com/office/drawing/2010/main" xmlns="">
+              <a14:hiddenFill xmlns:a14="http://schemas.microsoft.com/office/drawing/2010/main">
                 <a:solidFill>
                   <a:srgbClr val="FFFFFF"/>
                 </a:solidFill>
@@ -5372,8 +5527,8 @@
         </p:nvSpPr>
         <p:spPr>
           <a:xfrm>
-            <a:off x="864221" y="5688732"/>
-            <a:ext cx="5349165" cy="7373619"/>
+            <a:off x="864221" y="5688733"/>
+            <a:ext cx="5349165" cy="7210692"/>
           </a:xfrm>
           <a:ln/>
         </p:spPr>
@@ -5401,11 +5556,27 @@
               <a:buNone/>
             </a:pPr>
             <a:r>
-              <a:rPr lang="en-US" sz="1400" dirty="0" smtClean="0"/>
-              <a:t>This is how our GUI look likes at the moment </a:t>
-            </a:r>
-            <a:r>
-              <a:rPr lang="en-US" sz="1400" dirty="0" smtClean="0"/>
+              <a:rPr lang="en-US" sz="1100" dirty="0" smtClean="0"/>
+              <a:t>This is </a:t>
+            </a:r>
+            <a:r>
+              <a:rPr lang="en-US" sz="1100" dirty="0" smtClean="0"/>
+              <a:t>what our </a:t>
+            </a:r>
+            <a:r>
+              <a:rPr lang="en-US" sz="1100" dirty="0" smtClean="0"/>
+              <a:t>GUI </a:t>
+            </a:r>
+            <a:r>
+              <a:rPr lang="en-US" sz="1100" dirty="0" smtClean="0"/>
+              <a:t>looks </a:t>
+            </a:r>
+            <a:r>
+              <a:rPr lang="en-US" sz="1100" dirty="0" smtClean="0"/>
+              <a:t>likes at the moment </a:t>
+            </a:r>
+            <a:r>
+              <a:rPr lang="en-US" sz="1100" dirty="0" smtClean="0"/>
               <a:t>:</a:t>
             </a:r>
           </a:p>
@@ -5413,79 +5584,7 @@
             <a:pPr marL="0" indent="0">
               <a:buNone/>
             </a:pPr>
-            <a:endParaRPr lang="en-US" sz="1400" dirty="0" smtClean="0"/>
-          </a:p>
-          <a:p>
-            <a:pPr marL="0" indent="0">
-              <a:buNone/>
-            </a:pPr>
-            <a:endParaRPr lang="en-US" sz="1400" dirty="0" smtClean="0"/>
-          </a:p>
-          <a:p>
-            <a:pPr marL="0" indent="0">
-              <a:buNone/>
-            </a:pPr>
-            <a:endParaRPr lang="en-US" sz="1400" dirty="0" smtClean="0"/>
-          </a:p>
-          <a:p>
-            <a:pPr marL="0" indent="0">
-              <a:buNone/>
-            </a:pPr>
-            <a:endParaRPr lang="en-US" sz="1400" dirty="0" smtClean="0"/>
-          </a:p>
-          <a:p>
-            <a:pPr marL="0" indent="0">
-              <a:buNone/>
-            </a:pPr>
-            <a:endParaRPr lang="en-US" sz="1400" dirty="0" smtClean="0"/>
-          </a:p>
-          <a:p>
-            <a:pPr marL="0" indent="0">
-              <a:buNone/>
-            </a:pPr>
-            <a:endParaRPr lang="en-US" sz="1400" dirty="0" smtClean="0"/>
-          </a:p>
-          <a:p>
-            <a:pPr marL="0" indent="0">
-              <a:buNone/>
-            </a:pPr>
-            <a:endParaRPr lang="en-US" sz="1400" dirty="0" smtClean="0"/>
-          </a:p>
-          <a:p>
-            <a:pPr marL="0" indent="0">
-              <a:buNone/>
-            </a:pPr>
-            <a:endParaRPr lang="en-US" sz="1400" dirty="0" smtClean="0"/>
-          </a:p>
-          <a:p>
-            <a:pPr marL="0" indent="0">
-              <a:buNone/>
-            </a:pPr>
-            <a:endParaRPr lang="en-US" sz="1400" dirty="0" smtClean="0"/>
-          </a:p>
-          <a:p>
-            <a:pPr marL="0" indent="0">
-              <a:buNone/>
-            </a:pPr>
-            <a:endParaRPr lang="en-US" sz="1400" dirty="0" smtClean="0"/>
-          </a:p>
-          <a:p>
-            <a:pPr marL="0" indent="0">
-              <a:buNone/>
-            </a:pPr>
-            <a:endParaRPr lang="en-US" sz="1400" dirty="0" smtClean="0"/>
-          </a:p>
-          <a:p>
-            <a:pPr marL="0" indent="0">
-              <a:buNone/>
-            </a:pPr>
-            <a:endParaRPr lang="en-US" sz="1400" dirty="0" smtClean="0"/>
-          </a:p>
-          <a:p>
-            <a:pPr marL="0" indent="0">
-              <a:buNone/>
-            </a:pPr>
-            <a:endParaRPr lang="en-US" sz="1400" dirty="0" smtClean="0"/>
+            <a:endParaRPr lang="en-US" sz="1100" dirty="0"/>
           </a:p>
           <a:p>
             <a:pPr marL="0" indent="0">
@@ -5503,96 +5602,213 @@
             <a:pPr marL="0" indent="0">
               <a:buNone/>
             </a:pPr>
-            <a:r>
-              <a:rPr lang="en-US" sz="1100" dirty="0" smtClean="0"/>
-              <a:t>Now </a:t>
-            </a:r>
-            <a:r>
-              <a:rPr lang="en-US" sz="1100" dirty="0" smtClean="0"/>
-              <a:t>we have a import video button, a start processing button which changes in a pause button if pressed. And there is a reset button now. The GUI also contains a progress bar. This says something about how long the video remains. The list with the actual license plate is still the same. As you can see we are already reading and write down some license plates. Furthermore, the window of the GUI is now adjustable. Also if a license plate emerges a second in a row then the list wont show it.  This is still something we have to work on cause if the detector sees 1 character different it prints it and then the actual license plate will be printed right after it.  </a:t>
-            </a:r>
             <a:endParaRPr lang="en-US" sz="1100" dirty="0" smtClean="0"/>
           </a:p>
           <a:p>
             <a:pPr marL="0" indent="0">
               <a:buNone/>
             </a:pPr>
-            <a:endParaRPr lang="en-US" sz="1400" dirty="0" smtClean="0"/>
-          </a:p>
-          <a:p>
-            <a:pPr marL="0" indent="0">
-              <a:buNone/>
-            </a:pPr>
-            <a:endParaRPr lang="en-US" sz="1400" dirty="0" smtClean="0"/>
-          </a:p>
-          <a:p>
-            <a:pPr marL="0" indent="0">
-              <a:buNone/>
-            </a:pPr>
-            <a:r>
-              <a:rPr lang="en-US" sz="1400" dirty="0" smtClean="0"/>
+            <a:endParaRPr lang="en-US" sz="1100" dirty="0" smtClean="0"/>
+          </a:p>
+          <a:p>
+            <a:pPr marL="0" indent="0">
+              <a:buNone/>
+            </a:pPr>
+            <a:endParaRPr lang="en-US" sz="1100" dirty="0" smtClean="0"/>
+          </a:p>
+          <a:p>
+            <a:pPr marL="0" indent="0">
+              <a:buNone/>
+            </a:pPr>
+            <a:endParaRPr lang="en-US" sz="1100" dirty="0" smtClean="0"/>
+          </a:p>
+          <a:p>
+            <a:pPr marL="0" indent="0">
+              <a:buNone/>
+            </a:pPr>
+            <a:endParaRPr lang="en-US" sz="1100" dirty="0" smtClean="0"/>
+          </a:p>
+          <a:p>
+            <a:pPr marL="0" indent="0">
+              <a:buNone/>
+            </a:pPr>
+            <a:endParaRPr lang="en-US" sz="1100" dirty="0" smtClean="0"/>
+          </a:p>
+          <a:p>
+            <a:pPr marL="0" indent="0">
+              <a:buNone/>
+            </a:pPr>
+            <a:endParaRPr lang="en-US" sz="1100" dirty="0" smtClean="0"/>
+          </a:p>
+          <a:p>
+            <a:pPr marL="0" indent="0">
+              <a:buNone/>
+            </a:pPr>
+            <a:endParaRPr lang="en-US" sz="1100" dirty="0" smtClean="0"/>
+          </a:p>
+          <a:p>
+            <a:pPr marL="0" indent="0">
+              <a:buNone/>
+            </a:pPr>
+            <a:endParaRPr lang="en-US" sz="1100" dirty="0" smtClean="0"/>
+          </a:p>
+          <a:p>
+            <a:pPr marL="0" indent="0">
+              <a:buNone/>
+            </a:pPr>
+            <a:endParaRPr lang="en-US" sz="1100" dirty="0" smtClean="0"/>
+          </a:p>
+          <a:p>
+            <a:pPr marL="0" indent="0">
+              <a:buNone/>
+            </a:pPr>
+            <a:endParaRPr lang="en-US" sz="1100" dirty="0" smtClean="0"/>
+          </a:p>
+          <a:p>
+            <a:pPr marL="0" indent="0">
+              <a:buNone/>
+            </a:pPr>
+            <a:endParaRPr lang="en-US" sz="1100" dirty="0" smtClean="0"/>
+          </a:p>
+          <a:p>
+            <a:pPr marL="0" indent="0">
+              <a:buNone/>
+            </a:pPr>
+            <a:endParaRPr lang="en-US" sz="1100" dirty="0" smtClean="0"/>
+          </a:p>
+          <a:p>
+            <a:pPr marL="0" indent="0">
+              <a:buNone/>
+            </a:pPr>
+            <a:endParaRPr lang="en-US" sz="1100" dirty="0" smtClean="0"/>
+          </a:p>
+          <a:p>
+            <a:pPr marL="0" indent="0">
+              <a:buNone/>
+            </a:pPr>
+            <a:endParaRPr lang="en-US" sz="1100" dirty="0" smtClean="0"/>
+          </a:p>
+          <a:p>
+            <a:pPr marL="0" indent="0">
+              <a:buNone/>
+            </a:pPr>
+            <a:r>
+              <a:rPr lang="en-US" sz="1100" dirty="0" smtClean="0"/>
+              <a:t>We have rearranged the GUI elements and added some new features. The ‘</a:t>
+            </a:r>
+            <a:r>
+              <a:rPr lang="en-US" sz="1100" dirty="0" smtClean="0"/>
+              <a:t>Start processing’ button now changes to a pause button if the video is playing and the new ‘Reset’ button will play the video from the start again. </a:t>
+            </a:r>
+            <a:r>
+              <a:rPr lang="en-US" sz="1100" dirty="0" smtClean="0"/>
+              <a:t>The GUI also contains a progress </a:t>
+            </a:r>
+            <a:r>
+              <a:rPr lang="en-US" sz="1100" dirty="0" smtClean="0"/>
+              <a:t>bar which indicates how many frames out of the total have been processed. </a:t>
+            </a:r>
+            <a:r>
+              <a:rPr lang="en-US" sz="1100" dirty="0" smtClean="0"/>
+              <a:t>The list </a:t>
+            </a:r>
+            <a:r>
+              <a:rPr lang="en-US" sz="1100" dirty="0" smtClean="0"/>
+              <a:t>which contains the recognized license plates now also displays the frame and time when it was found. As </a:t>
+            </a:r>
+            <a:r>
+              <a:rPr lang="en-US" sz="1100" dirty="0" smtClean="0"/>
+              <a:t>you can see </a:t>
+            </a:r>
+            <a:r>
+              <a:rPr lang="en-US" sz="1100" dirty="0" smtClean="0"/>
+              <a:t>we’ve started working on recognizing the text from the license plates, which we will explain further in the ‘OCR’ section. </a:t>
+            </a:r>
+            <a:r>
+              <a:rPr lang="en-US" sz="1100" dirty="0" smtClean="0"/>
+              <a:t>Furthermore, the window of the GUI is now </a:t>
+            </a:r>
+            <a:r>
+              <a:rPr lang="en-US" sz="1100" dirty="0" smtClean="0"/>
+              <a:t>resizable and if </a:t>
+            </a:r>
+            <a:r>
+              <a:rPr lang="en-US" sz="1100" dirty="0" smtClean="0"/>
+              <a:t>a </a:t>
+            </a:r>
+            <a:r>
+              <a:rPr lang="en-US" sz="1100" dirty="0" smtClean="0"/>
+              <a:t>recognized license plate is the same as the previous entry in the list then it won’t be added. </a:t>
+            </a:r>
+            <a:r>
+              <a:rPr lang="en-US" sz="1100" dirty="0" smtClean="0"/>
               <a:t>This </a:t>
             </a:r>
             <a:r>
-              <a:rPr lang="en-US" sz="1400" dirty="0" smtClean="0"/>
-              <a:t>is an example of a correct result with its frame number and timestamp</a:t>
-            </a:r>
-            <a:r>
-              <a:rPr lang="en-US" sz="1400" dirty="0" smtClean="0"/>
-              <a:t>.</a:t>
-            </a:r>
-          </a:p>
-          <a:p>
-            <a:pPr marL="0" indent="0">
-              <a:buNone/>
-            </a:pPr>
-            <a:endParaRPr lang="en-US" sz="1400" dirty="0" smtClean="0"/>
-          </a:p>
-          <a:p>
-            <a:pPr marL="0" indent="0">
-              <a:buNone/>
-            </a:pPr>
-            <a:endParaRPr lang="en-US" sz="1400" dirty="0" smtClean="0"/>
-          </a:p>
-          <a:p>
-            <a:pPr marL="0" indent="0">
-              <a:buNone/>
-            </a:pPr>
-            <a:r>
-              <a:rPr lang="en-US" sz="1400" dirty="0" smtClean="0"/>
-              <a:t>This is </a:t>
-            </a:r>
-            <a:r>
-              <a:rPr lang="en-US" sz="1400" smtClean="0"/>
-              <a:t>an example </a:t>
-            </a:r>
-            <a:r>
-              <a:rPr lang="en-US" sz="1400" dirty="0" smtClean="0"/>
-              <a:t>of and wrongly read </a:t>
-            </a:r>
-            <a:r>
-              <a:rPr lang="en-US" sz="1400" smtClean="0"/>
+              <a:rPr lang="en-US" sz="1100" dirty="0" smtClean="0"/>
+              <a:t>is still something we have to work on </a:t>
+            </a:r>
+            <a:r>
+              <a:rPr lang="en-US" sz="1100" dirty="0" smtClean="0"/>
+              <a:t>because often the recognized text is slightly different than the actual text and we will explain this further in the ‘OCR’ section. </a:t>
+            </a:r>
+            <a:endParaRPr lang="en-US" sz="1100" dirty="0" smtClean="0"/>
+          </a:p>
+          <a:p>
+            <a:pPr marL="0" indent="0">
+              <a:buNone/>
+            </a:pPr>
+            <a:r>
+              <a:rPr lang="en-US" sz="1100" dirty="0" smtClean="0"/>
+              <a:t>This is an example of a correct result with its frame number and timestamp.</a:t>
+            </a:r>
+          </a:p>
+          <a:p>
+            <a:pPr marL="0" indent="0">
+              <a:buNone/>
+            </a:pPr>
+            <a:endParaRPr lang="en-US" sz="1100" dirty="0" smtClean="0"/>
+          </a:p>
+          <a:p>
+            <a:pPr marL="0" indent="0">
+              <a:buNone/>
+            </a:pPr>
+            <a:endParaRPr lang="en-US" sz="1100" dirty="0" smtClean="0"/>
+          </a:p>
+          <a:p>
+            <a:pPr marL="0" indent="0">
+              <a:buNone/>
+            </a:pPr>
+            <a:r>
+              <a:rPr lang="en-US" sz="1100" dirty="0" smtClean="0"/>
+              <a:t>This is an example of </a:t>
+            </a:r>
+            <a:r>
+              <a:rPr lang="en-US" sz="1100" dirty="0" smtClean="0"/>
+              <a:t>an incorrectly read </a:t>
+            </a:r>
+            <a:r>
+              <a:rPr lang="en-US" sz="1100" dirty="0" smtClean="0"/>
               <a:t>license plate.</a:t>
             </a:r>
-            <a:endParaRPr lang="en-US" sz="1400" dirty="0" smtClean="0"/>
-          </a:p>
-          <a:p>
-            <a:pPr marL="0" indent="0">
-              <a:buNone/>
-            </a:pPr>
-            <a:endParaRPr lang="en-US" sz="1400" dirty="0" smtClean="0"/>
-          </a:p>
-          <a:p>
-            <a:pPr marL="0" indent="0">
-              <a:buNone/>
-            </a:pPr>
-            <a:endParaRPr lang="en-US" sz="1400" dirty="0" smtClean="0"/>
-          </a:p>
-          <a:p>
-            <a:pPr marL="0" indent="0">
-              <a:buNone/>
-            </a:pPr>
-            <a:endParaRPr lang="en-US" sz="1400" dirty="0" smtClean="0"/>
+          </a:p>
+          <a:p>
+            <a:pPr marL="0" indent="0">
+              <a:buNone/>
+            </a:pPr>
+            <a:endParaRPr lang="en-US" sz="1100" dirty="0" smtClean="0"/>
+          </a:p>
+          <a:p>
+            <a:pPr marL="0" indent="0">
+              <a:buNone/>
+            </a:pPr>
+            <a:endParaRPr lang="en-US" sz="1100" dirty="0" smtClean="0"/>
+          </a:p>
+          <a:p>
+            <a:pPr marL="0" indent="0">
+              <a:buNone/>
+            </a:pPr>
+            <a:endParaRPr lang="en-US" sz="1100" dirty="0" smtClean="0"/>
           </a:p>
         </p:txBody>
       </p:sp>
@@ -5639,7 +5855,7 @@
         </p:nvSpPr>
         <p:spPr>
           <a:xfrm>
-            <a:off x="864221" y="4752628"/>
+            <a:off x="864221" y="4882242"/>
             <a:ext cx="5349165" cy="1036915"/>
           </a:xfrm>
         </p:spPr>
@@ -5706,7 +5922,7 @@
         </p:nvSpPr>
         <p:spPr>
           <a:xfrm>
-            <a:off x="12087182" y="10163514"/>
+            <a:off x="12121636" y="9092420"/>
             <a:ext cx="5349165" cy="1152128"/>
           </a:xfrm>
         </p:spPr>
@@ -5773,8 +5989,8 @@
         </p:nvSpPr>
         <p:spPr>
           <a:xfrm>
-            <a:off x="12087184" y="10981320"/>
-            <a:ext cx="5349165" cy="1918103"/>
+            <a:off x="12087184" y="9762374"/>
+            <a:ext cx="5349165" cy="1698570"/>
           </a:xfrm>
           <a:ln/>
         </p:spPr>
@@ -5803,11 +6019,7 @@
             </a:pPr>
             <a:r>
               <a:rPr lang="en-US" sz="1100" dirty="0" smtClean="0"/>
-              <a:t>We’re satisfied with the progress we made this iteration, and hope we will  </a:t>
-            </a:r>
-            <a:r>
-              <a:rPr lang="en-US" sz="1100" dirty="0" smtClean="0"/>
-              <a:t>finish</a:t>
+              <a:t>We’re satisfied with the progress we made this iteration, and hope we will  finish</a:t>
             </a:r>
           </a:p>
           <a:p>
@@ -5816,11 +6028,7 @@
             </a:pPr>
             <a:r>
               <a:rPr lang="en-US" sz="1100" dirty="0" smtClean="0"/>
-              <a:t>product </a:t>
-            </a:r>
-            <a:r>
-              <a:rPr lang="en-US" sz="1100" dirty="0" smtClean="0"/>
-              <a:t>for the next iteration which will pass the first two categories. </a:t>
+              <a:t>product for the next iteration which will pass the first two categories. </a:t>
             </a:r>
           </a:p>
           <a:p>
@@ -5829,20 +6037,17 @@
             </a:pPr>
             <a:r>
               <a:rPr lang="en-US" sz="1100" dirty="0" smtClean="0"/>
-              <a:t>Here are the tasks which we will focus on for the next iteration</a:t>
-            </a:r>
-            <a:r>
-              <a:rPr lang="en-US" sz="1100" dirty="0" smtClean="0"/>
-              <a:t>:</a:t>
+              <a:t>Here are the tasks which we will focus on for the next iteration:</a:t>
             </a:r>
           </a:p>
           <a:p>
             <a:pPr>
-              <a:buNone/>
-            </a:pPr>
-            <a:r>
-              <a:rPr lang="en-US" sz="1100" dirty="0" smtClean="0"/>
-              <a:t>- 	Speed </a:t>
+              <a:buFont typeface="Wingdings" panose="05000000000000000000" pitchFamily="2" charset="2"/>
+              <a:buChar char="§"/>
+            </a:pPr>
+            <a:r>
+              <a:rPr lang="en-US" sz="1100" dirty="0" smtClean="0"/>
+              <a:t>Speed </a:t>
             </a:r>
             <a:r>
               <a:rPr lang="en-US" sz="1100" dirty="0" smtClean="0"/>
@@ -5851,11 +6056,12 @@
           </a:p>
           <a:p>
             <a:pPr>
-              <a:buNone/>
-            </a:pPr>
-            <a:r>
-              <a:rPr lang="en-US" sz="1100" dirty="0" smtClean="0"/>
-              <a:t>-	Improve </a:t>
+              <a:buFont typeface="Wingdings" panose="05000000000000000000" pitchFamily="2" charset="2"/>
+              <a:buChar char="§"/>
+            </a:pPr>
+            <a:r>
+              <a:rPr lang="en-US" sz="1100" dirty="0" smtClean="0"/>
+              <a:t>Improve </a:t>
             </a:r>
             <a:r>
               <a:rPr lang="en-US" sz="1100" dirty="0" smtClean="0"/>
@@ -5864,11 +6070,12 @@
           </a:p>
           <a:p>
             <a:pPr>
-              <a:buNone/>
-            </a:pPr>
-            <a:r>
-              <a:rPr lang="en-US" sz="1100" dirty="0" smtClean="0"/>
-              <a:t>-	Find </a:t>
+              <a:buFont typeface="Wingdings" panose="05000000000000000000" pitchFamily="2" charset="2"/>
+              <a:buChar char="§"/>
+            </a:pPr>
+            <a:r>
+              <a:rPr lang="en-US" sz="1100" dirty="0" smtClean="0"/>
+              <a:t>Find </a:t>
             </a:r>
             <a:r>
               <a:rPr lang="en-US" sz="1100" dirty="0" smtClean="0"/>
@@ -5895,7 +6102,7 @@
           <a:blip r:embed="rId3" cstate="print">
             <a:extLst>
               <a:ext uri="{28A0092B-C50C-407E-A947-70E740481C1C}">
-                <a14:useLocalDpi xmlns:a14="http://schemas.microsoft.com/office/drawing/2010/main" xmlns="" val="0"/>
+                <a14:useLocalDpi xmlns:a14="http://schemas.microsoft.com/office/drawing/2010/main" val="0"/>
               </a:ext>
             </a:extLst>
           </a:blip>
@@ -5915,7 +6122,7 @@
           <a:noFill/>
           <a:extLst>
             <a:ext uri="{909E8E84-426E-40DD-AFC4-6F175D3DCCD1}">
-              <a14:hiddenFill xmlns:a14="http://schemas.microsoft.com/office/drawing/2010/main" xmlns="">
+              <a14:hiddenFill xmlns:a14="http://schemas.microsoft.com/office/drawing/2010/main">
                 <a:solidFill>
                   <a:srgbClr val="FFFFFF"/>
                 </a:solidFill>
@@ -5936,7 +6143,7 @@
           <a:blip r:embed="rId4" cstate="print">
             <a:extLst>
               <a:ext uri="{28A0092B-C50C-407E-A947-70E740481C1C}">
-                <a14:useLocalDpi xmlns:a14="http://schemas.microsoft.com/office/drawing/2010/main" xmlns="" val="0"/>
+                <a14:useLocalDpi xmlns:a14="http://schemas.microsoft.com/office/drawing/2010/main" val="0"/>
               </a:ext>
             </a:extLst>
           </a:blip>
@@ -5956,7 +6163,7 @@
           <a:noFill/>
           <a:extLst>
             <a:ext uri="{909E8E84-426E-40DD-AFC4-6F175D3DCCD1}">
-              <a14:hiddenFill xmlns:a14="http://schemas.microsoft.com/office/drawing/2010/main" xmlns="">
+              <a14:hiddenFill xmlns:a14="http://schemas.microsoft.com/office/drawing/2010/main">
                 <a:solidFill>
                   <a:srgbClr val="FFFFFF"/>
                 </a:solidFill>
@@ -5977,7 +6184,7 @@
           <a:blip r:embed="rId5" cstate="print">
             <a:extLst>
               <a:ext uri="{28A0092B-C50C-407E-A947-70E740481C1C}">
-                <a14:useLocalDpi xmlns:a14="http://schemas.microsoft.com/office/drawing/2010/main" xmlns="" val="0"/>
+                <a14:useLocalDpi xmlns:a14="http://schemas.microsoft.com/office/drawing/2010/main" val="0"/>
               </a:ext>
             </a:extLst>
           </a:blip>
@@ -5997,7 +6204,7 @@
           <a:noFill/>
           <a:extLst>
             <a:ext uri="{909E8E84-426E-40DD-AFC4-6F175D3DCCD1}">
-              <a14:hiddenFill xmlns:a14="http://schemas.microsoft.com/office/drawing/2010/main" xmlns="">
+              <a14:hiddenFill xmlns:a14="http://schemas.microsoft.com/office/drawing/2010/main">
                 <a:solidFill>
                   <a:srgbClr val="FFFFFF"/>
                 </a:solidFill>
@@ -6018,7 +6225,7 @@
           <a:blip r:embed="rId6" cstate="print">
             <a:extLst>
               <a:ext uri="{28A0092B-C50C-407E-A947-70E740481C1C}">
-                <a14:useLocalDpi xmlns:a14="http://schemas.microsoft.com/office/drawing/2010/main" xmlns="" val="0"/>
+                <a14:useLocalDpi xmlns:a14="http://schemas.microsoft.com/office/drawing/2010/main" val="0"/>
               </a:ext>
             </a:extLst>
           </a:blip>
@@ -6038,7 +6245,7 @@
           <a:noFill/>
           <a:extLst>
             <a:ext uri="{909E8E84-426E-40DD-AFC4-6F175D3DCCD1}">
-              <a14:hiddenFill xmlns:a14="http://schemas.microsoft.com/office/drawing/2010/main" xmlns="">
+              <a14:hiddenFill xmlns:a14="http://schemas.microsoft.com/office/drawing/2010/main">
                 <a:solidFill>
                   <a:srgbClr val="FFFFFF"/>
                 </a:solidFill>
@@ -6059,7 +6266,7 @@
           <a:blip r:embed="rId7" cstate="print">
             <a:extLst>
               <a:ext uri="{28A0092B-C50C-407E-A947-70E740481C1C}">
-                <a14:useLocalDpi xmlns:a14="http://schemas.microsoft.com/office/drawing/2010/main" xmlns="" val="0"/>
+                <a14:useLocalDpi xmlns:a14="http://schemas.microsoft.com/office/drawing/2010/main" val="0"/>
               </a:ext>
             </a:extLst>
           </a:blip>
@@ -6079,7 +6286,7 @@
           <a:noFill/>
           <a:extLst>
             <a:ext uri="{909E8E84-426E-40DD-AFC4-6F175D3DCCD1}">
-              <a14:hiddenFill xmlns:a14="http://schemas.microsoft.com/office/drawing/2010/main" xmlns="">
+              <a14:hiddenFill xmlns:a14="http://schemas.microsoft.com/office/drawing/2010/main">
                 <a:solidFill>
                   <a:srgbClr val="FFFFFF"/>
                 </a:solidFill>
@@ -6100,7 +6307,7 @@
           <a:blip r:embed="rId8" cstate="print">
             <a:extLst>
               <a:ext uri="{28A0092B-C50C-407E-A947-70E740481C1C}">
-                <a14:useLocalDpi xmlns:a14="http://schemas.microsoft.com/office/drawing/2010/main" xmlns="" val="0"/>
+                <a14:useLocalDpi xmlns:a14="http://schemas.microsoft.com/office/drawing/2010/main" val="0"/>
               </a:ext>
             </a:extLst>
           </a:blip>
@@ -6120,7 +6327,7 @@
           <a:noFill/>
           <a:extLst>
             <a:ext uri="{909E8E84-426E-40DD-AFC4-6F175D3DCCD1}">
-              <a14:hiddenFill xmlns:a14="http://schemas.microsoft.com/office/drawing/2010/main" xmlns="">
+              <a14:hiddenFill xmlns:a14="http://schemas.microsoft.com/office/drawing/2010/main">
                 <a:solidFill>
                   <a:srgbClr val="FFFFFF"/>
                 </a:solidFill>
@@ -6141,7 +6348,7 @@
           <a:blip r:embed="rId9" cstate="print">
             <a:extLst>
               <a:ext uri="{28A0092B-C50C-407E-A947-70E740481C1C}">
-                <a14:useLocalDpi xmlns:a14="http://schemas.microsoft.com/office/drawing/2010/main" xmlns="" val="0"/>
+                <a14:useLocalDpi xmlns:a14="http://schemas.microsoft.com/office/drawing/2010/main" val="0"/>
               </a:ext>
             </a:extLst>
           </a:blip>
@@ -6161,7 +6368,7 @@
           <a:noFill/>
           <a:extLst>
             <a:ext uri="{909E8E84-426E-40DD-AFC4-6F175D3DCCD1}">
-              <a14:hiddenFill xmlns:a14="http://schemas.microsoft.com/office/drawing/2010/main" xmlns="">
+              <a14:hiddenFill xmlns:a14="http://schemas.microsoft.com/office/drawing/2010/main">
                 <a:solidFill>
                   <a:srgbClr val="FFFFFF"/>
                 </a:solidFill>
@@ -6182,7 +6389,7 @@
           <a:blip r:embed="rId10" cstate="print">
             <a:extLst>
               <a:ext uri="{28A0092B-C50C-407E-A947-70E740481C1C}">
-                <a14:useLocalDpi xmlns:a14="http://schemas.microsoft.com/office/drawing/2010/main" xmlns="" val="0"/>
+                <a14:useLocalDpi xmlns:a14="http://schemas.microsoft.com/office/drawing/2010/main" val="0"/>
               </a:ext>
             </a:extLst>
           </a:blip>
@@ -6202,7 +6409,7 @@
           <a:noFill/>
           <a:extLst>
             <a:ext uri="{909E8E84-426E-40DD-AFC4-6F175D3DCCD1}">
-              <a14:hiddenFill xmlns:a14="http://schemas.microsoft.com/office/drawing/2010/main" xmlns="">
+              <a14:hiddenFill xmlns:a14="http://schemas.microsoft.com/office/drawing/2010/main">
                 <a:solidFill>
                   <a:srgbClr val="FFFFFF"/>
                 </a:solidFill>
@@ -6223,7 +6430,7 @@
           <a:blip r:embed="rId11" cstate="print">
             <a:extLst>
               <a:ext uri="{28A0092B-C50C-407E-A947-70E740481C1C}">
-                <a14:useLocalDpi xmlns:a14="http://schemas.microsoft.com/office/drawing/2010/main" xmlns="" val="0"/>
+                <a14:useLocalDpi xmlns:a14="http://schemas.microsoft.com/office/drawing/2010/main" val="0"/>
               </a:ext>
             </a:extLst>
           </a:blip>
@@ -6243,7 +6450,7 @@
           <a:noFill/>
           <a:extLst>
             <a:ext uri="{909E8E84-426E-40DD-AFC4-6F175D3DCCD1}">
-              <a14:hiddenFill xmlns:a14="http://schemas.microsoft.com/office/drawing/2010/main" xmlns="">
+              <a14:hiddenFill xmlns:a14="http://schemas.microsoft.com/office/drawing/2010/main">
                 <a:solidFill>
                   <a:srgbClr val="FFFFFF"/>
                 </a:solidFill>
@@ -6269,7 +6476,7 @@
         </p:blipFill>
         <p:spPr bwMode="auto">
           <a:xfrm>
-            <a:off x="864221" y="6192788"/>
+            <a:off x="936229" y="6048772"/>
             <a:ext cx="5256584" cy="3456384"/>
           </a:xfrm>
           <a:prstGeom prst="rect">
@@ -6302,7 +6509,7 @@
         </p:blipFill>
         <p:spPr bwMode="auto">
           <a:xfrm>
-            <a:off x="1008237" y="11161340"/>
+            <a:off x="1008237" y="11680476"/>
             <a:ext cx="5112568" cy="360040"/>
           </a:xfrm>
           <a:prstGeom prst="rect">
@@ -6335,7 +6542,7 @@
         </p:blipFill>
         <p:spPr bwMode="auto">
           <a:xfrm>
-            <a:off x="1008237" y="12169452"/>
+            <a:off x="1004130" y="12325014"/>
             <a:ext cx="5184576" cy="360040"/>
           </a:xfrm>
           <a:prstGeom prst="rect">
@@ -6351,10 +6558,41 @@
           <a:effectLst/>
         </p:spPr>
       </p:pic>
+      <p:cxnSp>
+        <p:nvCxnSpPr>
+          <p:cNvPr id="34" name="Rechte verbindingslijn 33"/>
+          <p:cNvCxnSpPr/>
+          <p:nvPr/>
+        </p:nvCxnSpPr>
+        <p:spPr>
+          <a:xfrm>
+            <a:off x="12071532" y="9793188"/>
+            <a:ext cx="5349165" cy="0"/>
+          </a:xfrm>
+          <a:prstGeom prst="line">
+            <a:avLst/>
+          </a:prstGeom>
+          <a:ln w="76200"/>
+        </p:spPr>
+        <p:style>
+          <a:lnRef idx="1">
+            <a:schemeClr val="accent1"/>
+          </a:lnRef>
+          <a:fillRef idx="0">
+            <a:schemeClr val="accent1"/>
+          </a:fillRef>
+          <a:effectRef idx="0">
+            <a:schemeClr val="accent1"/>
+          </a:effectRef>
+          <a:fontRef idx="minor">
+            <a:schemeClr val="tx1"/>
+          </a:fontRef>
+        </p:style>
+      </p:cxnSp>
     </p:spTree>
     <p:extLst>
       <p:ext uri="{BB962C8B-B14F-4D97-AF65-F5344CB8AC3E}">
-        <p14:creationId xmlns:p14="http://schemas.microsoft.com/office/powerpoint/2010/main" xmlns="" val="2651525738"/>
+        <p14:creationId xmlns:p14="http://schemas.microsoft.com/office/powerpoint/2010/main" val="2651525738"/>
       </p:ext>
     </p:extLst>
   </p:cSld>

</xml_diff>